<commit_message>
Adds bonus tip regarding VS Code extension
</commit_message>
<xml_diff>
--- a/presentation/Jan Egil Ring & Øyvind Kallstad - Containers - Where is my PowerShell.pptx
+++ b/presentation/Jan Egil Ring & Øyvind Kallstad - Containers - Where is my PowerShell.pptx
@@ -8,10 +8,10 @@
     <p:sldMasterId id="2147483814" r:id="rId4"/>
   </p:sldMasterIdLst>
   <p:notesMasterIdLst>
-    <p:notesMasterId r:id="rId12"/>
+    <p:notesMasterId r:id="rId14"/>
   </p:notesMasterIdLst>
   <p:handoutMasterIdLst>
-    <p:handoutMasterId r:id="rId13"/>
+    <p:handoutMasterId r:id="rId15"/>
   </p:handoutMasterIdLst>
   <p:sldIdLst>
     <p:sldId id="320" r:id="rId5"/>
@@ -21,6 +21,8 @@
     <p:sldId id="321" r:id="rId9"/>
     <p:sldId id="313" r:id="rId10"/>
     <p:sldId id="314" r:id="rId11"/>
+    <p:sldId id="322" r:id="rId12"/>
+    <p:sldId id="323" r:id="rId13"/>
   </p:sldIdLst>
   <p:sldSz cx="9144000" cy="6858000" type="screen4x3"/>
   <p:notesSz cx="7099300" cy="10234613"/>
@@ -1473,6 +1475,96 @@
 </p:notes>
 </file>
 
+<file path=ppt/notesSlides/notesSlide3.xml><?xml version="1.0" encoding="utf-8"?>
+<p:notes xmlns:a="http://schemas.openxmlformats.org/drawingml/2006/main" xmlns:r="http://schemas.openxmlformats.org/officeDocument/2006/relationships" xmlns:p="http://schemas.openxmlformats.org/presentationml/2006/main">
+  <p:cSld>
+    <p:spTree>
+      <p:nvGrpSpPr>
+        <p:cNvPr id="1" name=""/>
+        <p:cNvGrpSpPr/>
+        <p:nvPr/>
+      </p:nvGrpSpPr>
+      <p:grpSpPr>
+        <a:xfrm>
+          <a:off x="0" y="0"/>
+          <a:ext cx="0" cy="0"/>
+          <a:chOff x="0" y="0"/>
+          <a:chExt cx="0" cy="0"/>
+        </a:xfrm>
+      </p:grpSpPr>
+      <p:sp>
+        <p:nvSpPr>
+          <p:cNvPr id="2" name="Slide Image Placeholder 1"/>
+          <p:cNvSpPr>
+            <a:spLocks noGrp="1" noRot="1" noChangeAspect="1"/>
+          </p:cNvSpPr>
+          <p:nvPr>
+            <p:ph type="sldImg"/>
+          </p:nvPr>
+        </p:nvSpPr>
+        <p:spPr/>
+      </p:sp>
+      <p:sp>
+        <p:nvSpPr>
+          <p:cNvPr id="3" name="Notes Placeholder 2"/>
+          <p:cNvSpPr>
+            <a:spLocks noGrp="1"/>
+          </p:cNvSpPr>
+          <p:nvPr>
+            <p:ph type="body" idx="1"/>
+          </p:nvPr>
+        </p:nvSpPr>
+        <p:spPr/>
+        <p:txBody>
+          <a:bodyPr/>
+          <a:lstStyle/>
+          <a:p>
+            <a:endParaRPr lang="nb-NO" dirty="0"/>
+          </a:p>
+        </p:txBody>
+      </p:sp>
+      <p:sp>
+        <p:nvSpPr>
+          <p:cNvPr id="4" name="Slide Number Placeholder 3"/>
+          <p:cNvSpPr>
+            <a:spLocks noGrp="1"/>
+          </p:cNvSpPr>
+          <p:nvPr>
+            <p:ph type="sldNum" sz="quarter" idx="10"/>
+          </p:nvPr>
+        </p:nvSpPr>
+        <p:spPr/>
+        <p:txBody>
+          <a:bodyPr/>
+          <a:lstStyle/>
+          <a:p>
+            <a:pPr>
+              <a:defRPr/>
+            </a:pPr>
+            <a:fld id="{0C6D6275-D5B4-459A-B2A3-212CA60D2300}" type="slidenum">
+              <a:rPr lang="de-DE" smtClean="0"/>
+              <a:pPr>
+                <a:defRPr/>
+              </a:pPr>
+              <a:t>9</a:t>
+            </a:fld>
+            <a:endParaRPr lang="de-DE"/>
+          </a:p>
+        </p:txBody>
+      </p:sp>
+    </p:spTree>
+    <p:extLst>
+      <p:ext uri="{BB962C8B-B14F-4D97-AF65-F5344CB8AC3E}">
+        <p14:creationId xmlns:p14="http://schemas.microsoft.com/office/powerpoint/2010/main" val="2658013310"/>
+      </p:ext>
+    </p:extLst>
+  </p:cSld>
+  <p:clrMapOvr>
+    <a:masterClrMapping/>
+  </p:clrMapOvr>
+</p:notes>
+</file>
+
 <file path=ppt/slideLayouts/slideLayout1.xml><?xml version="1.0" encoding="utf-8"?>
 <p:sldLayout xmlns:a="http://schemas.openxmlformats.org/drawingml/2006/main" xmlns:r="http://schemas.openxmlformats.org/officeDocument/2006/relationships" xmlns:p="http://schemas.openxmlformats.org/presentationml/2006/main" showMasterSp="0" preserve="1" userDrawn="1">
   <p:cSld name="Presentation Start">
@@ -6504,7 +6596,7 @@
         </p:blipFill>
         <p:spPr>
           <a:xfrm>
-            <a:off x="5292080" y="2814110"/>
+            <a:off x="4932040" y="3284984"/>
             <a:ext cx="2523809" cy="1600000"/>
           </a:xfrm>
           <a:prstGeom prst="rect">
@@ -6534,7 +6626,7 @@
         </p:blipFill>
         <p:spPr>
           <a:xfrm>
-            <a:off x="971600" y="2890301"/>
+            <a:off x="1259632" y="2561174"/>
             <a:ext cx="2857143" cy="1447619"/>
           </a:xfrm>
           <a:prstGeom prst="rect">
@@ -6935,6 +7027,216 @@
       </p:transition>
     </mc:Fallback>
   </mc:AlternateContent>
+</p:sld>
+</file>
+
+<file path=ppt/slides/slide8.xml><?xml version="1.0" encoding="utf-8"?>
+<p:sld xmlns:a="http://schemas.openxmlformats.org/drawingml/2006/main" xmlns:r="http://schemas.openxmlformats.org/officeDocument/2006/relationships" xmlns:p="http://schemas.openxmlformats.org/presentationml/2006/main">
+  <p:cSld>
+    <p:spTree>
+      <p:nvGrpSpPr>
+        <p:cNvPr id="1" name=""/>
+        <p:cNvGrpSpPr/>
+        <p:nvPr/>
+      </p:nvGrpSpPr>
+      <p:grpSpPr>
+        <a:xfrm>
+          <a:off x="0" y="0"/>
+          <a:ext cx="0" cy="0"/>
+          <a:chOff x="0" y="0"/>
+          <a:chExt cx="0" cy="0"/>
+        </a:xfrm>
+      </p:grpSpPr>
+      <p:sp>
+        <p:nvSpPr>
+          <p:cNvPr id="4" name="Title 3">
+            <a:extLst>
+              <a:ext uri="{FF2B5EF4-FFF2-40B4-BE49-F238E27FC236}">
+                <a16:creationId xmlns:a16="http://schemas.microsoft.com/office/drawing/2014/main" id="{5B3791DC-CC8E-4BAB-AD42-092137756F12}"/>
+              </a:ext>
+            </a:extLst>
+          </p:cNvPr>
+          <p:cNvSpPr>
+            <a:spLocks noGrp="1"/>
+          </p:cNvSpPr>
+          <p:nvPr>
+            <p:ph type="title"/>
+          </p:nvPr>
+        </p:nvSpPr>
+        <p:spPr/>
+        <p:txBody>
+          <a:bodyPr/>
+          <a:lstStyle/>
+          <a:p>
+            <a:r>
+              <a:rPr lang="nb-NO" dirty="0"/>
+              <a:t>Bonus </a:t>
+            </a:r>
+            <a:r>
+              <a:rPr lang="nb-NO" dirty="0" err="1"/>
+              <a:t>tip</a:t>
+            </a:r>
+            <a:r>
+              <a:rPr lang="nb-NO" dirty="0"/>
+              <a:t>: VS Code </a:t>
+            </a:r>
+            <a:r>
+              <a:rPr lang="nb-NO" dirty="0" err="1"/>
+              <a:t>Extension</a:t>
+            </a:r>
+            <a:r>
+              <a:rPr lang="nb-NO" dirty="0"/>
+              <a:t> for </a:t>
+            </a:r>
+            <a:r>
+              <a:rPr lang="nb-NO" dirty="0" err="1"/>
+              <a:t>Docker</a:t>
+            </a:r>
+            <a:endParaRPr lang="nb-NO" dirty="0"/>
+          </a:p>
+        </p:txBody>
+      </p:sp>
+      <p:pic>
+        <p:nvPicPr>
+          <p:cNvPr id="5" name="Picture 4">
+            <a:extLst>
+              <a:ext uri="{FF2B5EF4-FFF2-40B4-BE49-F238E27FC236}">
+                <a16:creationId xmlns:a16="http://schemas.microsoft.com/office/drawing/2014/main" id="{25C2959F-B91E-42E1-A91F-4A5AFE476845}"/>
+              </a:ext>
+            </a:extLst>
+          </p:cNvPr>
+          <p:cNvPicPr>
+            <a:picLocks noChangeAspect="1"/>
+          </p:cNvPicPr>
+          <p:nvPr/>
+        </p:nvPicPr>
+        <p:blipFill>
+          <a:blip r:embed="rId2"/>
+          <a:stretch>
+            <a:fillRect/>
+          </a:stretch>
+        </p:blipFill>
+        <p:spPr>
+          <a:xfrm>
+            <a:off x="971600" y="1988840"/>
+            <a:ext cx="6561905" cy="3990476"/>
+          </a:xfrm>
+          <a:prstGeom prst="rect">
+            <a:avLst/>
+          </a:prstGeom>
+        </p:spPr>
+      </p:pic>
+    </p:spTree>
+    <p:extLst>
+      <p:ext uri="{BB962C8B-B14F-4D97-AF65-F5344CB8AC3E}">
+        <p14:creationId xmlns:p14="http://schemas.microsoft.com/office/powerpoint/2010/main" val="3101990871"/>
+      </p:ext>
+    </p:extLst>
+  </p:cSld>
+  <p:clrMapOvr>
+    <a:masterClrMapping/>
+  </p:clrMapOvr>
+</p:sld>
+</file>
+
+<file path=ppt/slides/slide9.xml><?xml version="1.0" encoding="utf-8"?>
+<p:sld xmlns:a="http://schemas.openxmlformats.org/drawingml/2006/main" xmlns:r="http://schemas.openxmlformats.org/officeDocument/2006/relationships" xmlns:p="http://schemas.openxmlformats.org/presentationml/2006/main">
+  <p:cSld>
+    <p:spTree>
+      <p:nvGrpSpPr>
+        <p:cNvPr id="1" name=""/>
+        <p:cNvGrpSpPr/>
+        <p:nvPr/>
+      </p:nvGrpSpPr>
+      <p:grpSpPr>
+        <a:xfrm>
+          <a:off x="0" y="0"/>
+          <a:ext cx="0" cy="0"/>
+          <a:chOff x="0" y="0"/>
+          <a:chExt cx="0" cy="0"/>
+        </a:xfrm>
+      </p:grpSpPr>
+      <p:sp>
+        <p:nvSpPr>
+          <p:cNvPr id="2" name="Title 1">
+            <a:extLst>
+              <a:ext uri="{FF2B5EF4-FFF2-40B4-BE49-F238E27FC236}">
+                <a16:creationId xmlns:a16="http://schemas.microsoft.com/office/drawing/2014/main" id="{EB1673A5-9906-4874-913C-0D8CCBCBE0BD}"/>
+              </a:ext>
+            </a:extLst>
+          </p:cNvPr>
+          <p:cNvSpPr>
+            <a:spLocks noGrp="1"/>
+          </p:cNvSpPr>
+          <p:nvPr>
+            <p:ph type="title"/>
+          </p:nvPr>
+        </p:nvSpPr>
+        <p:spPr/>
+        <p:txBody>
+          <a:bodyPr/>
+          <a:lstStyle/>
+          <a:p>
+            <a:r>
+              <a:rPr lang="nb-NO" dirty="0"/>
+              <a:t>VS Code </a:t>
+            </a:r>
+            <a:r>
+              <a:rPr lang="nb-NO" dirty="0" err="1"/>
+              <a:t>Extension</a:t>
+            </a:r>
+            <a:r>
+              <a:rPr lang="nb-NO" dirty="0"/>
+              <a:t> for </a:t>
+            </a:r>
+            <a:r>
+              <a:rPr lang="nb-NO" dirty="0" err="1"/>
+              <a:t>Docker</a:t>
+            </a:r>
+            <a:endParaRPr lang="nb-NO" dirty="0"/>
+          </a:p>
+        </p:txBody>
+      </p:sp>
+      <p:pic>
+        <p:nvPicPr>
+          <p:cNvPr id="3" name="Picture 2">
+            <a:extLst>
+              <a:ext uri="{FF2B5EF4-FFF2-40B4-BE49-F238E27FC236}">
+                <a16:creationId xmlns:a16="http://schemas.microsoft.com/office/drawing/2014/main" id="{C18D52DD-5CB6-49D8-A55F-61CB6B8100AC}"/>
+              </a:ext>
+            </a:extLst>
+          </p:cNvPr>
+          <p:cNvPicPr>
+            <a:picLocks noChangeAspect="1"/>
+          </p:cNvPicPr>
+          <p:nvPr/>
+        </p:nvPicPr>
+        <p:blipFill>
+          <a:blip r:embed="rId3"/>
+          <a:stretch>
+            <a:fillRect/>
+          </a:stretch>
+        </p:blipFill>
+        <p:spPr>
+          <a:xfrm>
+            <a:off x="683568" y="1844824"/>
+            <a:ext cx="7400000" cy="4219048"/>
+          </a:xfrm>
+          <a:prstGeom prst="rect">
+            <a:avLst/>
+          </a:prstGeom>
+        </p:spPr>
+      </p:pic>
+    </p:spTree>
+    <p:extLst>
+      <p:ext uri="{BB962C8B-B14F-4D97-AF65-F5344CB8AC3E}">
+        <p14:creationId xmlns:p14="http://schemas.microsoft.com/office/powerpoint/2010/main" val="29313995"/>
+      </p:ext>
+    </p:extLst>
+  </p:cSld>
+  <p:clrMapOvr>
+    <a:masterClrMapping/>
+  </p:clrMapOvr>
 </p:sld>
 </file>
 

</xml_diff>

<commit_message>
Adds PSDockerTools as a discussion point
</commit_message>
<xml_diff>
--- a/presentation/Jan Egil Ring & Øyvind Kallstad - Containers - Where is my PowerShell.pptx
+++ b/presentation/Jan Egil Ring & Øyvind Kallstad - Containers - Where is my PowerShell.pptx
@@ -8,21 +8,22 @@
     <p:sldMasterId id="2147483814" r:id="rId4"/>
   </p:sldMasterIdLst>
   <p:notesMasterIdLst>
-    <p:notesMasterId r:id="rId14"/>
+    <p:notesMasterId r:id="rId15"/>
   </p:notesMasterIdLst>
   <p:handoutMasterIdLst>
-    <p:handoutMasterId r:id="rId15"/>
+    <p:handoutMasterId r:id="rId16"/>
   </p:handoutMasterIdLst>
   <p:sldIdLst>
     <p:sldId id="320" r:id="rId5"/>
     <p:sldId id="305" r:id="rId6"/>
     <p:sldId id="310" r:id="rId7"/>
-    <p:sldId id="302" r:id="rId8"/>
-    <p:sldId id="321" r:id="rId9"/>
-    <p:sldId id="313" r:id="rId10"/>
-    <p:sldId id="314" r:id="rId11"/>
-    <p:sldId id="322" r:id="rId12"/>
-    <p:sldId id="323" r:id="rId13"/>
+    <p:sldId id="324" r:id="rId8"/>
+    <p:sldId id="302" r:id="rId9"/>
+    <p:sldId id="321" r:id="rId10"/>
+    <p:sldId id="313" r:id="rId11"/>
+    <p:sldId id="314" r:id="rId12"/>
+    <p:sldId id="322" r:id="rId13"/>
+    <p:sldId id="323" r:id="rId14"/>
   </p:sldIdLst>
   <p:sldSz cx="9144000" cy="6858000" type="screen4x3"/>
   <p:notesSz cx="7099300" cy="10234613"/>
@@ -1296,140 +1297,8 @@
           <a:p>
             <a:r>
               <a:rPr lang="nb-NO" dirty="0"/>
-              <a:t>function Get-ContactInfo {</a:t>
-            </a:r>
-          </a:p>
-          <a:p>
-            <a:endParaRPr lang="nb-NO" dirty="0"/>
-          </a:p>
-          <a:p>
-            <a:r>
-              <a:rPr lang="nb-NO" dirty="0"/>
-              <a:t>[pscustomobject] @{</a:t>
-            </a:r>
-          </a:p>
-          <a:p>
-            <a:r>
-              <a:rPr lang="nb-NO" dirty="0"/>
-              <a:t>Name = ' Jan Egil Ring '</a:t>
-            </a:r>
-          </a:p>
-          <a:p>
-            <a:r>
-              <a:rPr lang="nb-NO" dirty="0"/>
-              <a:t>'E-mail ' = ' jan.egil.ring@crayon.com'</a:t>
-            </a:r>
-          </a:p>
-          <a:p>
-            <a:r>
-              <a:rPr lang="nb-NO" dirty="0"/>
-              <a:t>Twitter = ' @JanEgilRing '</a:t>
-            </a:r>
-          </a:p>
-          <a:p>
-            <a:r>
-              <a:rPr lang="nb-NO" dirty="0"/>
-              <a:t>Website = @('www.powershell.no’)  </a:t>
-            </a:r>
-          </a:p>
-          <a:p>
-            <a:r>
-              <a:rPr lang="nb-NO" dirty="0"/>
-              <a:t>  } | Format-List</a:t>
-            </a:r>
-          </a:p>
-          <a:p>
-            <a:endParaRPr lang="nb-NO" dirty="0"/>
-          </a:p>
-          <a:p>
-            <a:endParaRPr lang="nb-NO" dirty="0"/>
-          </a:p>
-          <a:p>
-            <a:r>
-              <a:rPr lang="nb-NO" dirty="0"/>
-              <a:t>} </a:t>
-            </a:r>
-          </a:p>
-          <a:p>
-            <a:endParaRPr lang="nb-NO" dirty="0"/>
-          </a:p>
-          <a:p>
-            <a:r>
-              <a:rPr lang="nb-NO" dirty="0"/>
-              <a:t>function Get-ContactInfo {</a:t>
-            </a:r>
-          </a:p>
-          <a:p>
-            <a:endParaRPr lang="nb-NO" dirty="0"/>
-          </a:p>
-          <a:p>
-            <a:r>
-              <a:rPr lang="nb-NO" dirty="0"/>
-              <a:t>[pscustomobject] @{</a:t>
-            </a:r>
-          </a:p>
-          <a:p>
-            <a:r>
-              <a:rPr lang="nb-NO" dirty="0"/>
-              <a:t>Name = ‘ Øyvind Kallstad'</a:t>
-            </a:r>
-          </a:p>
-          <a:p>
-            <a:r>
-              <a:rPr lang="nb-NO" dirty="0"/>
-              <a:t>'E-mail ' = ‘ okallstad@gmail.com'</a:t>
-            </a:r>
-          </a:p>
-          <a:p>
-            <a:r>
-              <a:rPr lang="nb-NO" dirty="0"/>
-              <a:t>Twitter = ‘ @OKallstad'</a:t>
-            </a:r>
-          </a:p>
-          <a:p>
-            <a:r>
-              <a:rPr lang="nb-NO" dirty="0"/>
-              <a:t>Website = @(‘communary.net’)  </a:t>
-            </a:r>
-          </a:p>
-          <a:p>
-            <a:r>
-              <a:rPr lang="nb-NO" dirty="0"/>
-              <a:t>  } | Format-List</a:t>
-            </a:r>
-          </a:p>
-          <a:p>
-            <a:endParaRPr lang="nb-NO" dirty="0"/>
-          </a:p>
-          <a:p>
-            <a:endParaRPr lang="nb-NO" dirty="0"/>
-          </a:p>
-          <a:p>
-            <a:r>
-              <a:rPr lang="nb-NO" dirty="0"/>
-              <a:t>} </a:t>
-            </a:r>
-          </a:p>
-          <a:p>
-            <a:endParaRPr lang="nb-NO" dirty="0"/>
-          </a:p>
-          <a:p>
-            <a:endParaRPr lang="nb-NO" dirty="0"/>
-          </a:p>
-          <a:p>
-            <a:endParaRPr lang="nb-NO" dirty="0"/>
-          </a:p>
-          <a:p>
-            <a:r>
-              <a:rPr lang="nb-NO" dirty="0"/>
-              <a:t>Get-ContactInfo</a:t>
-            </a:r>
-          </a:p>
-          <a:p>
-            <a:endParaRPr lang="nb-NO" dirty="0"/>
-          </a:p>
-          <a:p>
-            <a:endParaRPr lang="nb-NO" dirty="0"/>
+              <a:t>PowerShell inside containers, exception: GUI-based cmdlets such as Out-GridView won`t work since containers is headless.</a:t>
+            </a:r>
           </a:p>
         </p:txBody>
       </p:sp>
@@ -1465,7 +1334,7 @@
     </p:spTree>
     <p:extLst>
       <p:ext uri="{BB962C8B-B14F-4D97-AF65-F5344CB8AC3E}">
-        <p14:creationId xmlns:p14="http://schemas.microsoft.com/office/powerpoint/2010/main" val="3419093838"/>
+        <p14:creationId xmlns:p14="http://schemas.microsoft.com/office/powerpoint/2010/main" val="1760773078"/>
       </p:ext>
     </p:extLst>
   </p:cSld>
@@ -1519,6 +1388,141 @@
           <a:bodyPr/>
           <a:lstStyle/>
           <a:p>
+            <a:r>
+              <a:rPr lang="nb-NO" dirty="0"/>
+              <a:t>function Get-ContactInfo {</a:t>
+            </a:r>
+          </a:p>
+          <a:p>
+            <a:endParaRPr lang="nb-NO" dirty="0"/>
+          </a:p>
+          <a:p>
+            <a:r>
+              <a:rPr lang="nb-NO" dirty="0"/>
+              <a:t>[pscustomobject] @{</a:t>
+            </a:r>
+          </a:p>
+          <a:p>
+            <a:r>
+              <a:rPr lang="nb-NO" dirty="0"/>
+              <a:t>Name = ' Jan Egil Ring '</a:t>
+            </a:r>
+          </a:p>
+          <a:p>
+            <a:r>
+              <a:rPr lang="nb-NO" dirty="0"/>
+              <a:t>'E-mail ' = ' jan.egil.ring@crayon.com'</a:t>
+            </a:r>
+          </a:p>
+          <a:p>
+            <a:r>
+              <a:rPr lang="nb-NO" dirty="0"/>
+              <a:t>Twitter = ' @JanEgilRing '</a:t>
+            </a:r>
+          </a:p>
+          <a:p>
+            <a:r>
+              <a:rPr lang="nb-NO" dirty="0"/>
+              <a:t>Website = @('www.powershell.no’)  </a:t>
+            </a:r>
+          </a:p>
+          <a:p>
+            <a:r>
+              <a:rPr lang="nb-NO" dirty="0"/>
+              <a:t>  } | Format-List</a:t>
+            </a:r>
+          </a:p>
+          <a:p>
+            <a:endParaRPr lang="nb-NO" dirty="0"/>
+          </a:p>
+          <a:p>
+            <a:endParaRPr lang="nb-NO" dirty="0"/>
+          </a:p>
+          <a:p>
+            <a:r>
+              <a:rPr lang="nb-NO" dirty="0"/>
+              <a:t>} </a:t>
+            </a:r>
+          </a:p>
+          <a:p>
+            <a:endParaRPr lang="nb-NO" dirty="0"/>
+          </a:p>
+          <a:p>
+            <a:r>
+              <a:rPr lang="nb-NO" dirty="0"/>
+              <a:t>function Get-ContactInfo {</a:t>
+            </a:r>
+          </a:p>
+          <a:p>
+            <a:endParaRPr lang="nb-NO" dirty="0"/>
+          </a:p>
+          <a:p>
+            <a:r>
+              <a:rPr lang="nb-NO" dirty="0"/>
+              <a:t>[pscustomobject] @{</a:t>
+            </a:r>
+          </a:p>
+          <a:p>
+            <a:r>
+              <a:rPr lang="nb-NO" dirty="0"/>
+              <a:t>Name = ‘ Øyvind Kallstad'</a:t>
+            </a:r>
+          </a:p>
+          <a:p>
+            <a:r>
+              <a:rPr lang="nb-NO" dirty="0"/>
+              <a:t>'E-mail ' = ‘ okallstad@gmail.com'</a:t>
+            </a:r>
+          </a:p>
+          <a:p>
+            <a:r>
+              <a:rPr lang="nb-NO" dirty="0"/>
+              <a:t>Twitter = ‘ @OKallstad'</a:t>
+            </a:r>
+          </a:p>
+          <a:p>
+            <a:r>
+              <a:rPr lang="nb-NO" dirty="0"/>
+              <a:t>Website = @(‘communary.net’)  </a:t>
+            </a:r>
+          </a:p>
+          <a:p>
+            <a:r>
+              <a:rPr lang="nb-NO" dirty="0"/>
+              <a:t>  } | Format-List</a:t>
+            </a:r>
+          </a:p>
+          <a:p>
+            <a:endParaRPr lang="nb-NO" dirty="0"/>
+          </a:p>
+          <a:p>
+            <a:endParaRPr lang="nb-NO" dirty="0"/>
+          </a:p>
+          <a:p>
+            <a:r>
+              <a:rPr lang="nb-NO" dirty="0"/>
+              <a:t>} </a:t>
+            </a:r>
+          </a:p>
+          <a:p>
+            <a:endParaRPr lang="nb-NO" dirty="0"/>
+          </a:p>
+          <a:p>
+            <a:endParaRPr lang="nb-NO" dirty="0"/>
+          </a:p>
+          <a:p>
+            <a:endParaRPr lang="nb-NO" dirty="0"/>
+          </a:p>
+          <a:p>
+            <a:r>
+              <a:rPr lang="nb-NO" dirty="0"/>
+              <a:t>Get-ContactInfo</a:t>
+            </a:r>
+          </a:p>
+          <a:p>
+            <a:endParaRPr lang="nb-NO" dirty="0"/>
+          </a:p>
+          <a:p>
             <a:endParaRPr lang="nb-NO" dirty="0"/>
           </a:p>
         </p:txBody>
@@ -1546,7 +1550,97 @@
               <a:pPr>
                 <a:defRPr/>
               </a:pPr>
-              <a:t>9</a:t>
+              <a:t>6</a:t>
+            </a:fld>
+            <a:endParaRPr lang="de-DE"/>
+          </a:p>
+        </p:txBody>
+      </p:sp>
+    </p:spTree>
+    <p:extLst>
+      <p:ext uri="{BB962C8B-B14F-4D97-AF65-F5344CB8AC3E}">
+        <p14:creationId xmlns:p14="http://schemas.microsoft.com/office/powerpoint/2010/main" val="3419093838"/>
+      </p:ext>
+    </p:extLst>
+  </p:cSld>
+  <p:clrMapOvr>
+    <a:masterClrMapping/>
+  </p:clrMapOvr>
+</p:notes>
+</file>
+
+<file path=ppt/notesSlides/notesSlide4.xml><?xml version="1.0" encoding="utf-8"?>
+<p:notes xmlns:a="http://schemas.openxmlformats.org/drawingml/2006/main" xmlns:r="http://schemas.openxmlformats.org/officeDocument/2006/relationships" xmlns:p="http://schemas.openxmlformats.org/presentationml/2006/main">
+  <p:cSld>
+    <p:spTree>
+      <p:nvGrpSpPr>
+        <p:cNvPr id="1" name=""/>
+        <p:cNvGrpSpPr/>
+        <p:nvPr/>
+      </p:nvGrpSpPr>
+      <p:grpSpPr>
+        <a:xfrm>
+          <a:off x="0" y="0"/>
+          <a:ext cx="0" cy="0"/>
+          <a:chOff x="0" y="0"/>
+          <a:chExt cx="0" cy="0"/>
+        </a:xfrm>
+      </p:grpSpPr>
+      <p:sp>
+        <p:nvSpPr>
+          <p:cNvPr id="2" name="Slide Image Placeholder 1"/>
+          <p:cNvSpPr>
+            <a:spLocks noGrp="1" noRot="1" noChangeAspect="1"/>
+          </p:cNvSpPr>
+          <p:nvPr>
+            <p:ph type="sldImg"/>
+          </p:nvPr>
+        </p:nvSpPr>
+        <p:spPr/>
+      </p:sp>
+      <p:sp>
+        <p:nvSpPr>
+          <p:cNvPr id="3" name="Notes Placeholder 2"/>
+          <p:cNvSpPr>
+            <a:spLocks noGrp="1"/>
+          </p:cNvSpPr>
+          <p:nvPr>
+            <p:ph type="body" idx="1"/>
+          </p:nvPr>
+        </p:nvSpPr>
+        <p:spPr/>
+        <p:txBody>
+          <a:bodyPr/>
+          <a:lstStyle/>
+          <a:p>
+            <a:endParaRPr lang="nb-NO" dirty="0"/>
+          </a:p>
+        </p:txBody>
+      </p:sp>
+      <p:sp>
+        <p:nvSpPr>
+          <p:cNvPr id="4" name="Slide Number Placeholder 3"/>
+          <p:cNvSpPr>
+            <a:spLocks noGrp="1"/>
+          </p:cNvSpPr>
+          <p:nvPr>
+            <p:ph type="sldNum" sz="quarter" idx="10"/>
+          </p:nvPr>
+        </p:nvSpPr>
+        <p:spPr/>
+        <p:txBody>
+          <a:bodyPr/>
+          <a:lstStyle/>
+          <a:p>
+            <a:pPr>
+              <a:defRPr/>
+            </a:pPr>
+            <a:fld id="{0C6D6275-D5B4-459A-B2A3-212CA60D2300}" type="slidenum">
+              <a:rPr lang="de-DE" smtClean="0"/>
+              <a:pPr>
+                <a:defRPr/>
+              </a:pPr>
+              <a:t>10</a:t>
             </a:fld>
             <a:endParaRPr lang="de-DE"/>
           </a:p>
@@ -6220,6 +6314,107 @@
 </p:sld>
 </file>
 
+<file path=ppt/slides/slide10.xml><?xml version="1.0" encoding="utf-8"?>
+<p:sld xmlns:a="http://schemas.openxmlformats.org/drawingml/2006/main" xmlns:r="http://schemas.openxmlformats.org/officeDocument/2006/relationships" xmlns:p="http://schemas.openxmlformats.org/presentationml/2006/main">
+  <p:cSld>
+    <p:spTree>
+      <p:nvGrpSpPr>
+        <p:cNvPr id="1" name=""/>
+        <p:cNvGrpSpPr/>
+        <p:nvPr/>
+      </p:nvGrpSpPr>
+      <p:grpSpPr>
+        <a:xfrm>
+          <a:off x="0" y="0"/>
+          <a:ext cx="0" cy="0"/>
+          <a:chOff x="0" y="0"/>
+          <a:chExt cx="0" cy="0"/>
+        </a:xfrm>
+      </p:grpSpPr>
+      <p:sp>
+        <p:nvSpPr>
+          <p:cNvPr id="2" name="Title 1">
+            <a:extLst>
+              <a:ext uri="{FF2B5EF4-FFF2-40B4-BE49-F238E27FC236}">
+                <a16:creationId xmlns:a16="http://schemas.microsoft.com/office/drawing/2014/main" id="{EB1673A5-9906-4874-913C-0D8CCBCBE0BD}"/>
+              </a:ext>
+            </a:extLst>
+          </p:cNvPr>
+          <p:cNvSpPr>
+            <a:spLocks noGrp="1"/>
+          </p:cNvSpPr>
+          <p:nvPr>
+            <p:ph type="title"/>
+          </p:nvPr>
+        </p:nvSpPr>
+        <p:spPr/>
+        <p:txBody>
+          <a:bodyPr/>
+          <a:lstStyle/>
+          <a:p>
+            <a:r>
+              <a:rPr lang="nb-NO" dirty="0"/>
+              <a:t>VS Code </a:t>
+            </a:r>
+            <a:r>
+              <a:rPr lang="nb-NO" dirty="0" err="1"/>
+              <a:t>Extension</a:t>
+            </a:r>
+            <a:r>
+              <a:rPr lang="nb-NO" dirty="0"/>
+              <a:t> for </a:t>
+            </a:r>
+            <a:r>
+              <a:rPr lang="nb-NO" dirty="0" err="1"/>
+              <a:t>Docker</a:t>
+            </a:r>
+            <a:endParaRPr lang="nb-NO" dirty="0"/>
+          </a:p>
+        </p:txBody>
+      </p:sp>
+      <p:pic>
+        <p:nvPicPr>
+          <p:cNvPr id="3" name="Picture 2">
+            <a:extLst>
+              <a:ext uri="{FF2B5EF4-FFF2-40B4-BE49-F238E27FC236}">
+                <a16:creationId xmlns:a16="http://schemas.microsoft.com/office/drawing/2014/main" id="{C18D52DD-5CB6-49D8-A55F-61CB6B8100AC}"/>
+              </a:ext>
+            </a:extLst>
+          </p:cNvPr>
+          <p:cNvPicPr>
+            <a:picLocks noChangeAspect="1"/>
+          </p:cNvPicPr>
+          <p:nvPr/>
+        </p:nvPicPr>
+        <p:blipFill>
+          <a:blip r:embed="rId3"/>
+          <a:stretch>
+            <a:fillRect/>
+          </a:stretch>
+        </p:blipFill>
+        <p:spPr>
+          <a:xfrm>
+            <a:off x="683568" y="1844824"/>
+            <a:ext cx="7400000" cy="4219048"/>
+          </a:xfrm>
+          <a:prstGeom prst="rect">
+            <a:avLst/>
+          </a:prstGeom>
+        </p:spPr>
+      </p:pic>
+    </p:spTree>
+    <p:extLst>
+      <p:ext uri="{BB962C8B-B14F-4D97-AF65-F5344CB8AC3E}">
+        <p14:creationId xmlns:p14="http://schemas.microsoft.com/office/powerpoint/2010/main" val="29313995"/>
+      </p:ext>
+    </p:extLst>
+  </p:cSld>
+  <p:clrMapOvr>
+    <a:masterClrMapping/>
+  </p:clrMapOvr>
+</p:sld>
+</file>
+
 <file path=ppt/slides/slide2.xml><?xml version="1.0" encoding="utf-8"?>
 <p:sld xmlns:a="http://schemas.openxmlformats.org/drawingml/2006/main" xmlns:r="http://schemas.openxmlformats.org/officeDocument/2006/relationships" xmlns:p="http://schemas.openxmlformats.org/presentationml/2006/main">
   <p:cSld>
@@ -6440,37 +6635,13 @@
       </p:grpSpPr>
       <p:sp>
         <p:nvSpPr>
-          <p:cNvPr id="2" name="Titel 1"/>
-          <p:cNvSpPr>
-            <a:spLocks noGrp="1"/>
-          </p:cNvSpPr>
-          <p:nvPr>
-            <p:ph type="title"/>
-          </p:nvPr>
-        </p:nvSpPr>
-        <p:spPr>
-          <a:xfrm>
-            <a:off x="0" y="908720"/>
-            <a:ext cx="9144000" cy="792088"/>
-          </a:xfrm>
-          <a:prstGeom prst="rect">
-            <a:avLst/>
-          </a:prstGeom>
-        </p:spPr>
-        <p:txBody>
-          <a:bodyPr/>
-          <a:lstStyle/>
-          <a:p>
-            <a:r>
-              <a:rPr lang="de-DE" dirty="0"/>
-              <a:t>Summary</a:t>
-            </a:r>
-          </a:p>
-        </p:txBody>
-      </p:sp>
-      <p:sp>
-        <p:nvSpPr>
-          <p:cNvPr id="3" name="Inhaltsplatzhalter 2"/>
+          <p:cNvPr id="2" name="Content Placeholder 1">
+            <a:extLst>
+              <a:ext uri="{FF2B5EF4-FFF2-40B4-BE49-F238E27FC236}">
+                <a16:creationId xmlns:a16="http://schemas.microsoft.com/office/drawing/2014/main" id="{B072218A-73DC-4F2A-A7FE-C25C2A27822F}"/>
+              </a:ext>
+            </a:extLst>
+          </p:cNvPr>
           <p:cNvSpPr>
             <a:spLocks noGrp="1"/>
           </p:cNvSpPr>
@@ -6485,27 +6656,49 @@
           <a:p>
             <a:r>
               <a:rPr lang="de-DE" dirty="0"/>
-              <a:t>PowerShell is great for managing containers</a:t>
+              <a:t>PSDockerTools – new community-based module</a:t>
             </a:r>
           </a:p>
           <a:p>
             <a:pPr lvl="1"/>
             <a:r>
-              <a:rPr lang="de-DE" dirty="0"/>
-              <a:t>PSDockerTools – new community-based module</a:t>
-            </a:r>
-          </a:p>
-          <a:p>
-            <a:r>
-              <a:rPr lang="de-DE" dirty="0"/>
-              <a:t>PowerShell can be used inside containers</a:t>
+              <a:rPr lang="nb-NO" dirty="0"/>
+              <a:t>Go or no-go?</a:t>
             </a:r>
           </a:p>
           <a:p>
             <a:pPr lvl="1"/>
             <a:r>
-              <a:rPr lang="de-DE" dirty="0"/>
-              <a:t>Use PowerShell Core to also be able to leverage PowerShell inside Linux and Nano Server containers</a:t>
+              <a:rPr lang="nb-NO" dirty="0"/>
+              <a:t>Are there any value in creating a «proper» Docker module for PowerShell, or will most people use the native Docker CLI (docker.exe) anyway?</a:t>
+            </a:r>
+          </a:p>
+        </p:txBody>
+      </p:sp>
+      <p:sp>
+        <p:nvSpPr>
+          <p:cNvPr id="3" name="Title 2">
+            <a:extLst>
+              <a:ext uri="{FF2B5EF4-FFF2-40B4-BE49-F238E27FC236}">
+                <a16:creationId xmlns:a16="http://schemas.microsoft.com/office/drawing/2014/main" id="{B4491BC5-6A93-47B1-87E9-1ABFD684BC40}"/>
+              </a:ext>
+            </a:extLst>
+          </p:cNvPr>
+          <p:cNvSpPr>
+            <a:spLocks noGrp="1"/>
+          </p:cNvSpPr>
+          <p:nvPr>
+            <p:ph type="title"/>
+          </p:nvPr>
+        </p:nvSpPr>
+        <p:spPr/>
+        <p:txBody>
+          <a:bodyPr/>
+          <a:lstStyle/>
+          <a:p>
+            <a:r>
+              <a:rPr lang="nb-NO" dirty="0"/>
+              <a:t>Discussion point</a:t>
             </a:r>
           </a:p>
         </p:txBody>
@@ -6513,7 +6706,7 @@
     </p:spTree>
     <p:extLst>
       <p:ext uri="{BB962C8B-B14F-4D97-AF65-F5344CB8AC3E}">
-        <p14:creationId xmlns:p14="http://schemas.microsoft.com/office/powerpoint/2010/main" val="3109724331"/>
+        <p14:creationId xmlns:p14="http://schemas.microsoft.com/office/powerpoint/2010/main" val="1768448564"/>
       </p:ext>
     </p:extLst>
   </p:cSld>
@@ -6522,12 +6715,12 @@
   </p:clrMapOvr>
   <mc:AlternateContent xmlns:mc="http://schemas.openxmlformats.org/markup-compatibility/2006" xmlns:p14="http://schemas.microsoft.com/office/powerpoint/2010/main">
     <mc:Choice Requires="p14">
-      <p:transition spd="med" p14:dur="700">
-        <p:fade/>
+      <p:transition spd="slow" p14:dur="1300">
+        <p14:pan dir="u"/>
       </p:transition>
     </mc:Choice>
     <mc:Fallback xmlns="">
-      <p:transition spd="med">
+      <p:transition spd="slow">
         <p:fade/>
       </p:transition>
     </mc:Fallback>
@@ -6554,7 +6747,7 @@
       </p:grpSpPr>
       <p:sp>
         <p:nvSpPr>
-          <p:cNvPr id="3" name="Titel 2"/>
+          <p:cNvPr id="2" name="Titel 1"/>
           <p:cNvSpPr>
             <a:spLocks noGrp="1"/>
           </p:cNvSpPr>
@@ -6562,82 +6755,86 @@
             <p:ph type="title"/>
           </p:nvPr>
         </p:nvSpPr>
-        <p:spPr/>
-        <p:txBody>
-          <a:bodyPr/>
-          <a:lstStyle/>
-          <a:p>
-            <a:r>
-              <a:rPr lang="de-DE" dirty="0"/>
-              <a:t>about_Author</a:t>
-            </a:r>
-          </a:p>
-        </p:txBody>
-      </p:sp>
-      <p:pic>
-        <p:nvPicPr>
-          <p:cNvPr id="2" name="Picture 1">
-            <a:extLst>
-              <a:ext uri="{FF2B5EF4-FFF2-40B4-BE49-F238E27FC236}">
-                <a16:creationId xmlns:a16="http://schemas.microsoft.com/office/drawing/2014/main" id="{630BA343-5889-45F5-985A-BD2B11F86064}"/>
-              </a:ext>
-            </a:extLst>
-          </p:cNvPr>
-          <p:cNvPicPr>
-            <a:picLocks noChangeAspect="1"/>
-          </p:cNvPicPr>
-          <p:nvPr/>
-        </p:nvPicPr>
-        <p:blipFill>
-          <a:blip r:embed="rId3"/>
-          <a:stretch>
-            <a:fillRect/>
-          </a:stretch>
-        </p:blipFill>
         <p:spPr>
           <a:xfrm>
-            <a:off x="4932040" y="3284984"/>
-            <a:ext cx="2523809" cy="1600000"/>
+            <a:off x="0" y="908720"/>
+            <a:ext cx="9144000" cy="792088"/>
           </a:xfrm>
           <a:prstGeom prst="rect">
             <a:avLst/>
           </a:prstGeom>
         </p:spPr>
-      </p:pic>
-      <p:pic>
-        <p:nvPicPr>
-          <p:cNvPr id="7" name="Picture 6">
-            <a:extLst>
-              <a:ext uri="{FF2B5EF4-FFF2-40B4-BE49-F238E27FC236}">
-                <a16:creationId xmlns:a16="http://schemas.microsoft.com/office/drawing/2014/main" id="{083999F6-60D7-4146-A6FB-69525AC2A831}"/>
-              </a:ext>
-            </a:extLst>
-          </p:cNvPr>
-          <p:cNvPicPr>
-            <a:picLocks noChangeAspect="1"/>
-          </p:cNvPicPr>
-          <p:nvPr/>
-        </p:nvPicPr>
-        <p:blipFill>
-          <a:blip r:embed="rId4"/>
-          <a:stretch>
-            <a:fillRect/>
-          </a:stretch>
-        </p:blipFill>
-        <p:spPr>
-          <a:xfrm>
-            <a:off x="1259632" y="2561174"/>
-            <a:ext cx="2857143" cy="1447619"/>
-          </a:xfrm>
-          <a:prstGeom prst="rect">
-            <a:avLst/>
-          </a:prstGeom>
-        </p:spPr>
-      </p:pic>
+        <p:txBody>
+          <a:bodyPr/>
+          <a:lstStyle/>
+          <a:p>
+            <a:r>
+              <a:rPr lang="de-DE" dirty="0"/>
+              <a:t>Summary</a:t>
+            </a:r>
+          </a:p>
+        </p:txBody>
+      </p:sp>
+      <p:sp>
+        <p:nvSpPr>
+          <p:cNvPr id="3" name="Inhaltsplatzhalter 2"/>
+          <p:cNvSpPr>
+            <a:spLocks noGrp="1"/>
+          </p:cNvSpPr>
+          <p:nvPr>
+            <p:ph idx="1"/>
+          </p:nvPr>
+        </p:nvSpPr>
+        <p:spPr/>
+        <p:txBody>
+          <a:bodyPr/>
+          <a:lstStyle/>
+          <a:p>
+            <a:r>
+              <a:rPr lang="de-DE" dirty="0"/>
+              <a:t>PowerShell is great for managing containers</a:t>
+            </a:r>
+          </a:p>
+          <a:p>
+            <a:pPr lvl="1"/>
+            <a:r>
+              <a:rPr lang="de-DE" dirty="0"/>
+              <a:t>ConvertFrom-Json is your friend</a:t>
+            </a:r>
+          </a:p>
+          <a:p>
+            <a:pPr lvl="1"/>
+            <a:r>
+              <a:rPr lang="de-DE" dirty="0"/>
+              <a:t>PowerShell can be the glue for integrations</a:t>
+            </a:r>
+          </a:p>
+          <a:p>
+            <a:r>
+              <a:rPr lang="de-DE" dirty="0"/>
+              <a:t>PowerShell can be used inside containers</a:t>
+            </a:r>
+          </a:p>
+          <a:p>
+            <a:pPr lvl="1"/>
+            <a:r>
+              <a:rPr lang="de-DE" dirty="0"/>
+              <a:t>“ Business as usual“ – can be used like we are used to</a:t>
+            </a:r>
+          </a:p>
+          <a:p>
+            <a:pPr lvl="1"/>
+            <a:r>
+              <a:rPr lang="de-DE" dirty="0"/>
+              <a:t>With PowerShell Core, it is also possible to leverage PowerShell inside Linux and Nano Server containers</a:t>
+            </a:r>
+          </a:p>
+        </p:txBody>
+      </p:sp>
     </p:spTree>
     <p:extLst>
       <p:ext uri="{BB962C8B-B14F-4D97-AF65-F5344CB8AC3E}">
-        <p14:creationId xmlns:p14="http://schemas.microsoft.com/office/powerpoint/2010/main" val="4266886937"/>
+        <p14:creationId xmlns:p14="http://schemas.microsoft.com/office/powerpoint/2010/main" val="3109724331"/>
       </p:ext>
     </p:extLst>
   </p:cSld>
@@ -6678,226 +6875,6 @@
       </p:grpSpPr>
       <p:sp>
         <p:nvSpPr>
-          <p:cNvPr id="2" name="Inhaltsplatzhalter 1"/>
-          <p:cNvSpPr>
-            <a:spLocks noGrp="1"/>
-          </p:cNvSpPr>
-          <p:nvPr>
-            <p:ph idx="1"/>
-          </p:nvPr>
-        </p:nvSpPr>
-        <p:spPr/>
-        <p:txBody>
-          <a:bodyPr/>
-          <a:lstStyle/>
-          <a:p>
-            <a:r>
-              <a:rPr lang="de-DE" dirty="0" err="1"/>
-              <a:t>Now</a:t>
-            </a:r>
-            <a:r>
-              <a:rPr lang="de-DE" dirty="0"/>
-              <a:t>: 15 min break</a:t>
-            </a:r>
-          </a:p>
-          <a:p>
-            <a:endParaRPr lang="de-DE" dirty="0"/>
-          </a:p>
-          <a:p>
-            <a:r>
-              <a:rPr lang="de-DE" dirty="0"/>
-              <a:t>Grab a </a:t>
-            </a:r>
-            <a:r>
-              <a:rPr lang="de-DE" dirty="0" err="1"/>
-              <a:t>coffee</a:t>
-            </a:r>
-            <a:endParaRPr lang="de-DE" dirty="0"/>
-          </a:p>
-          <a:p>
-            <a:r>
-              <a:rPr lang="de-DE" dirty="0" err="1"/>
-              <a:t>Stay</a:t>
-            </a:r>
-            <a:r>
-              <a:rPr lang="de-DE" dirty="0"/>
-              <a:t> </a:t>
-            </a:r>
-            <a:r>
-              <a:rPr lang="de-DE" dirty="0" err="1"/>
-              <a:t>here</a:t>
-            </a:r>
-            <a:r>
-              <a:rPr lang="de-DE" dirty="0"/>
-              <a:t> </a:t>
-            </a:r>
-            <a:r>
-              <a:rPr lang="de-DE" dirty="0" err="1"/>
-              <a:t>to</a:t>
-            </a:r>
-            <a:r>
-              <a:rPr lang="de-DE" dirty="0"/>
-              <a:t> </a:t>
-            </a:r>
-            <a:r>
-              <a:rPr lang="de-DE" dirty="0" err="1"/>
-              <a:t>enjoy</a:t>
-            </a:r>
-            <a:r>
-              <a:rPr lang="de-DE" dirty="0"/>
-              <a:t> </a:t>
-            </a:r>
-            <a:r>
-              <a:rPr lang="de-DE" dirty="0" err="1"/>
-              <a:t>next</a:t>
-            </a:r>
-            <a:r>
-              <a:rPr lang="de-DE" dirty="0"/>
-              <a:t> </a:t>
-            </a:r>
-            <a:r>
-              <a:rPr lang="de-DE" dirty="0" err="1"/>
-              <a:t>presentation</a:t>
-            </a:r>
-            <a:endParaRPr lang="de-DE" dirty="0"/>
-          </a:p>
-          <a:p>
-            <a:r>
-              <a:rPr lang="de-DE" dirty="0"/>
-              <a:t>Change </a:t>
-            </a:r>
-            <a:r>
-              <a:rPr lang="de-DE" dirty="0" err="1"/>
-              <a:t>track</a:t>
-            </a:r>
-            <a:r>
-              <a:rPr lang="de-DE" dirty="0"/>
-              <a:t> </a:t>
-            </a:r>
-            <a:r>
-              <a:rPr lang="de-DE" dirty="0" err="1"/>
-              <a:t>and</a:t>
-            </a:r>
-            <a:r>
-              <a:rPr lang="de-DE" dirty="0"/>
-              <a:t> </a:t>
-            </a:r>
-            <a:r>
-              <a:rPr lang="de-DE" dirty="0" err="1"/>
-              <a:t>switch</a:t>
-            </a:r>
-            <a:r>
-              <a:rPr lang="de-DE" dirty="0"/>
-              <a:t> </a:t>
-            </a:r>
-            <a:r>
-              <a:rPr lang="de-DE" dirty="0" err="1"/>
-              <a:t>to</a:t>
-            </a:r>
-            <a:r>
-              <a:rPr lang="de-DE" dirty="0"/>
-              <a:t> </a:t>
-            </a:r>
-            <a:r>
-              <a:rPr lang="de-DE" dirty="0" err="1"/>
-              <a:t>another</a:t>
-            </a:r>
-            <a:r>
-              <a:rPr lang="de-DE" dirty="0"/>
-              <a:t> </a:t>
-            </a:r>
-            <a:r>
-              <a:rPr lang="de-DE" dirty="0" err="1"/>
-              <a:t>room</a:t>
-            </a:r>
-            <a:endParaRPr lang="de-DE" dirty="0"/>
-          </a:p>
-          <a:p>
-            <a:endParaRPr lang="de-DE" dirty="0"/>
-          </a:p>
-          <a:p>
-            <a:r>
-              <a:rPr lang="de-DE" dirty="0" err="1"/>
-              <a:t>Ask</a:t>
-            </a:r>
-            <a:r>
-              <a:rPr lang="de-DE" dirty="0"/>
-              <a:t> </a:t>
-            </a:r>
-            <a:r>
-              <a:rPr lang="de-DE" dirty="0" err="1"/>
-              <a:t>me</a:t>
-            </a:r>
-            <a:r>
-              <a:rPr lang="de-DE" dirty="0"/>
-              <a:t> </a:t>
-            </a:r>
-            <a:r>
-              <a:rPr lang="de-DE" dirty="0" err="1"/>
-              <a:t>questions</a:t>
-            </a:r>
-            <a:r>
-              <a:rPr lang="de-DE" dirty="0"/>
-              <a:t> </a:t>
-            </a:r>
-            <a:r>
-              <a:rPr lang="de-DE" dirty="0" err="1"/>
-              <a:t>or</a:t>
-            </a:r>
-            <a:r>
-              <a:rPr lang="de-DE" dirty="0"/>
-              <a:t> </a:t>
-            </a:r>
-            <a:r>
-              <a:rPr lang="de-DE" dirty="0" err="1"/>
-              <a:t>meet</a:t>
-            </a:r>
-            <a:r>
-              <a:rPr lang="de-DE" dirty="0"/>
-              <a:t> </a:t>
-            </a:r>
-            <a:r>
-              <a:rPr lang="de-DE" dirty="0" err="1"/>
-              <a:t>me</a:t>
-            </a:r>
-            <a:r>
-              <a:rPr lang="de-DE" dirty="0"/>
-              <a:t> in a </a:t>
-            </a:r>
-            <a:r>
-              <a:rPr lang="de-DE" dirty="0" err="1"/>
-              <a:t>breakout</a:t>
-            </a:r>
-            <a:r>
-              <a:rPr lang="de-DE" dirty="0"/>
-              <a:t> </a:t>
-            </a:r>
-            <a:r>
-              <a:rPr lang="de-DE" dirty="0" err="1"/>
-              <a:t>session</a:t>
-            </a:r>
-            <a:r>
-              <a:rPr lang="de-DE" dirty="0"/>
-              <a:t> </a:t>
-            </a:r>
-            <a:r>
-              <a:rPr lang="de-DE" dirty="0" err="1"/>
-              <a:t>room</a:t>
-            </a:r>
-            <a:r>
-              <a:rPr lang="de-DE" dirty="0"/>
-              <a:t> </a:t>
-            </a:r>
-            <a:r>
-              <a:rPr lang="de-DE" dirty="0" err="1"/>
-              <a:t>afterwards</a:t>
-            </a:r>
-            <a:endParaRPr lang="de-DE" dirty="0"/>
-          </a:p>
-        </p:txBody>
-      </p:sp>
-      <p:sp>
-        <p:nvSpPr>
           <p:cNvPr id="3" name="Titel 2"/>
           <p:cNvSpPr>
             <a:spLocks noGrp="1"/>
@@ -6913,15 +6890,75 @@
           <a:p>
             <a:r>
               <a:rPr lang="de-DE" dirty="0"/>
-              <a:t>Next Steps</a:t>
+              <a:t>about_Author</a:t>
             </a:r>
           </a:p>
         </p:txBody>
       </p:sp>
+      <p:pic>
+        <p:nvPicPr>
+          <p:cNvPr id="2" name="Picture 1">
+            <a:extLst>
+              <a:ext uri="{FF2B5EF4-FFF2-40B4-BE49-F238E27FC236}">
+                <a16:creationId xmlns:a16="http://schemas.microsoft.com/office/drawing/2014/main" id="{630BA343-5889-45F5-985A-BD2B11F86064}"/>
+              </a:ext>
+            </a:extLst>
+          </p:cNvPr>
+          <p:cNvPicPr>
+            <a:picLocks noChangeAspect="1"/>
+          </p:cNvPicPr>
+          <p:nvPr/>
+        </p:nvPicPr>
+        <p:blipFill>
+          <a:blip r:embed="rId3"/>
+          <a:stretch>
+            <a:fillRect/>
+          </a:stretch>
+        </p:blipFill>
+        <p:spPr>
+          <a:xfrm>
+            <a:off x="5004048" y="3573016"/>
+            <a:ext cx="3024336" cy="1917315"/>
+          </a:xfrm>
+          <a:prstGeom prst="rect">
+            <a:avLst/>
+          </a:prstGeom>
+        </p:spPr>
+      </p:pic>
+      <p:pic>
+        <p:nvPicPr>
+          <p:cNvPr id="7" name="Picture 6">
+            <a:extLst>
+              <a:ext uri="{FF2B5EF4-FFF2-40B4-BE49-F238E27FC236}">
+                <a16:creationId xmlns:a16="http://schemas.microsoft.com/office/drawing/2014/main" id="{083999F6-60D7-4146-A6FB-69525AC2A831}"/>
+              </a:ext>
+            </a:extLst>
+          </p:cNvPr>
+          <p:cNvPicPr>
+            <a:picLocks noChangeAspect="1"/>
+          </p:cNvPicPr>
+          <p:nvPr/>
+        </p:nvPicPr>
+        <p:blipFill>
+          <a:blip r:embed="rId4"/>
+          <a:stretch>
+            <a:fillRect/>
+          </a:stretch>
+        </p:blipFill>
+        <p:spPr>
+          <a:xfrm>
+            <a:off x="683568" y="2060848"/>
+            <a:ext cx="3553027" cy="1800200"/>
+          </a:xfrm>
+          <a:prstGeom prst="rect">
+            <a:avLst/>
+          </a:prstGeom>
+        </p:spPr>
+      </p:pic>
     </p:spTree>
     <p:extLst>
       <p:ext uri="{BB962C8B-B14F-4D97-AF65-F5344CB8AC3E}">
-        <p14:creationId xmlns:p14="http://schemas.microsoft.com/office/powerpoint/2010/main" val="3397310615"/>
+        <p14:creationId xmlns:p14="http://schemas.microsoft.com/office/powerpoint/2010/main" val="4266886937"/>
       </p:ext>
     </p:extLst>
   </p:cSld>
@@ -6962,7 +6999,227 @@
       </p:grpSpPr>
       <p:sp>
         <p:nvSpPr>
-          <p:cNvPr id="2" name="Titel 1"/>
+          <p:cNvPr id="2" name="Inhaltsplatzhalter 1"/>
+          <p:cNvSpPr>
+            <a:spLocks noGrp="1"/>
+          </p:cNvSpPr>
+          <p:nvPr>
+            <p:ph idx="1"/>
+          </p:nvPr>
+        </p:nvSpPr>
+        <p:spPr/>
+        <p:txBody>
+          <a:bodyPr/>
+          <a:lstStyle/>
+          <a:p>
+            <a:r>
+              <a:rPr lang="de-DE" dirty="0" err="1"/>
+              <a:t>Now</a:t>
+            </a:r>
+            <a:r>
+              <a:rPr lang="de-DE" dirty="0"/>
+              <a:t>: 15 min break</a:t>
+            </a:r>
+          </a:p>
+          <a:p>
+            <a:endParaRPr lang="de-DE" dirty="0"/>
+          </a:p>
+          <a:p>
+            <a:r>
+              <a:rPr lang="de-DE" dirty="0"/>
+              <a:t>Grab a </a:t>
+            </a:r>
+            <a:r>
+              <a:rPr lang="de-DE" dirty="0" err="1"/>
+              <a:t>coffee</a:t>
+            </a:r>
+            <a:endParaRPr lang="de-DE" dirty="0"/>
+          </a:p>
+          <a:p>
+            <a:r>
+              <a:rPr lang="de-DE" dirty="0" err="1"/>
+              <a:t>Stay</a:t>
+            </a:r>
+            <a:r>
+              <a:rPr lang="de-DE" dirty="0"/>
+              <a:t> </a:t>
+            </a:r>
+            <a:r>
+              <a:rPr lang="de-DE" dirty="0" err="1"/>
+              <a:t>here</a:t>
+            </a:r>
+            <a:r>
+              <a:rPr lang="de-DE" dirty="0"/>
+              <a:t> </a:t>
+            </a:r>
+            <a:r>
+              <a:rPr lang="de-DE" dirty="0" err="1"/>
+              <a:t>to</a:t>
+            </a:r>
+            <a:r>
+              <a:rPr lang="de-DE" dirty="0"/>
+              <a:t> </a:t>
+            </a:r>
+            <a:r>
+              <a:rPr lang="de-DE" dirty="0" err="1"/>
+              <a:t>enjoy</a:t>
+            </a:r>
+            <a:r>
+              <a:rPr lang="de-DE" dirty="0"/>
+              <a:t> </a:t>
+            </a:r>
+            <a:r>
+              <a:rPr lang="de-DE" dirty="0" err="1"/>
+              <a:t>next</a:t>
+            </a:r>
+            <a:r>
+              <a:rPr lang="de-DE" dirty="0"/>
+              <a:t> </a:t>
+            </a:r>
+            <a:r>
+              <a:rPr lang="de-DE" dirty="0" err="1"/>
+              <a:t>presentation</a:t>
+            </a:r>
+            <a:endParaRPr lang="de-DE" dirty="0"/>
+          </a:p>
+          <a:p>
+            <a:r>
+              <a:rPr lang="de-DE" dirty="0"/>
+              <a:t>Change </a:t>
+            </a:r>
+            <a:r>
+              <a:rPr lang="de-DE" dirty="0" err="1"/>
+              <a:t>track</a:t>
+            </a:r>
+            <a:r>
+              <a:rPr lang="de-DE" dirty="0"/>
+              <a:t> </a:t>
+            </a:r>
+            <a:r>
+              <a:rPr lang="de-DE" dirty="0" err="1"/>
+              <a:t>and</a:t>
+            </a:r>
+            <a:r>
+              <a:rPr lang="de-DE" dirty="0"/>
+              <a:t> </a:t>
+            </a:r>
+            <a:r>
+              <a:rPr lang="de-DE" dirty="0" err="1"/>
+              <a:t>switch</a:t>
+            </a:r>
+            <a:r>
+              <a:rPr lang="de-DE" dirty="0"/>
+              <a:t> </a:t>
+            </a:r>
+            <a:r>
+              <a:rPr lang="de-DE" dirty="0" err="1"/>
+              <a:t>to</a:t>
+            </a:r>
+            <a:r>
+              <a:rPr lang="de-DE" dirty="0"/>
+              <a:t> </a:t>
+            </a:r>
+            <a:r>
+              <a:rPr lang="de-DE" dirty="0" err="1"/>
+              <a:t>another</a:t>
+            </a:r>
+            <a:r>
+              <a:rPr lang="de-DE" dirty="0"/>
+              <a:t> </a:t>
+            </a:r>
+            <a:r>
+              <a:rPr lang="de-DE" dirty="0" err="1"/>
+              <a:t>room</a:t>
+            </a:r>
+            <a:endParaRPr lang="de-DE" dirty="0"/>
+          </a:p>
+          <a:p>
+            <a:endParaRPr lang="de-DE" dirty="0"/>
+          </a:p>
+          <a:p>
+            <a:r>
+              <a:rPr lang="de-DE" dirty="0" err="1"/>
+              <a:t>Ask</a:t>
+            </a:r>
+            <a:r>
+              <a:rPr lang="de-DE" dirty="0"/>
+              <a:t> </a:t>
+            </a:r>
+            <a:r>
+              <a:rPr lang="de-DE" dirty="0" err="1"/>
+              <a:t>me</a:t>
+            </a:r>
+            <a:r>
+              <a:rPr lang="de-DE" dirty="0"/>
+              <a:t> </a:t>
+            </a:r>
+            <a:r>
+              <a:rPr lang="de-DE" dirty="0" err="1"/>
+              <a:t>questions</a:t>
+            </a:r>
+            <a:r>
+              <a:rPr lang="de-DE" dirty="0"/>
+              <a:t> </a:t>
+            </a:r>
+            <a:r>
+              <a:rPr lang="de-DE" dirty="0" err="1"/>
+              <a:t>or</a:t>
+            </a:r>
+            <a:r>
+              <a:rPr lang="de-DE" dirty="0"/>
+              <a:t> </a:t>
+            </a:r>
+            <a:r>
+              <a:rPr lang="de-DE" dirty="0" err="1"/>
+              <a:t>meet</a:t>
+            </a:r>
+            <a:r>
+              <a:rPr lang="de-DE" dirty="0"/>
+              <a:t> </a:t>
+            </a:r>
+            <a:r>
+              <a:rPr lang="de-DE" dirty="0" err="1"/>
+              <a:t>me</a:t>
+            </a:r>
+            <a:r>
+              <a:rPr lang="de-DE" dirty="0"/>
+              <a:t> in a </a:t>
+            </a:r>
+            <a:r>
+              <a:rPr lang="de-DE" dirty="0" err="1"/>
+              <a:t>breakout</a:t>
+            </a:r>
+            <a:r>
+              <a:rPr lang="de-DE" dirty="0"/>
+              <a:t> </a:t>
+            </a:r>
+            <a:r>
+              <a:rPr lang="de-DE" dirty="0" err="1"/>
+              <a:t>session</a:t>
+            </a:r>
+            <a:r>
+              <a:rPr lang="de-DE" dirty="0"/>
+              <a:t> </a:t>
+            </a:r>
+            <a:r>
+              <a:rPr lang="de-DE" dirty="0" err="1"/>
+              <a:t>room</a:t>
+            </a:r>
+            <a:r>
+              <a:rPr lang="de-DE" dirty="0"/>
+              <a:t> </a:t>
+            </a:r>
+            <a:r>
+              <a:rPr lang="de-DE" dirty="0" err="1"/>
+              <a:t>afterwards</a:t>
+            </a:r>
+            <a:endParaRPr lang="de-DE" dirty="0"/>
+          </a:p>
+        </p:txBody>
+      </p:sp>
+      <p:sp>
+        <p:nvSpPr>
+          <p:cNvPr id="3" name="Titel 2"/>
           <p:cNvSpPr>
             <a:spLocks noGrp="1"/>
           </p:cNvSpPr>
@@ -6976,39 +7233,16 @@
           <a:lstStyle/>
           <a:p>
             <a:r>
-              <a:rPr lang="de-DE" dirty="0" err="1"/>
-              <a:t>Questions</a:t>
-            </a:r>
-            <a:r>
               <a:rPr lang="de-DE" dirty="0"/>
-              <a:t>?</a:t>
-            </a:r>
-          </a:p>
-        </p:txBody>
-      </p:sp>
-      <p:sp>
-        <p:nvSpPr>
-          <p:cNvPr id="3" name="Textplatzhalter 2"/>
-          <p:cNvSpPr>
-            <a:spLocks noGrp="1"/>
-          </p:cNvSpPr>
-          <p:nvPr>
-            <p:ph type="body" idx="1"/>
-          </p:nvPr>
-        </p:nvSpPr>
-        <p:spPr/>
-        <p:txBody>
-          <a:bodyPr/>
-          <a:lstStyle/>
-          <a:p>
-            <a:endParaRPr lang="de-DE" dirty="0"/>
+              <a:t>Next Steps</a:t>
+            </a:r>
           </a:p>
         </p:txBody>
       </p:sp>
     </p:spTree>
     <p:extLst>
       <p:ext uri="{BB962C8B-B14F-4D97-AF65-F5344CB8AC3E}">
-        <p14:creationId xmlns:p14="http://schemas.microsoft.com/office/powerpoint/2010/main" val="4184402693"/>
+        <p14:creationId xmlns:p14="http://schemas.microsoft.com/office/powerpoint/2010/main" val="3397310615"/>
       </p:ext>
     </p:extLst>
   </p:cSld>
@@ -7049,6 +7283,93 @@
       </p:grpSpPr>
       <p:sp>
         <p:nvSpPr>
+          <p:cNvPr id="2" name="Titel 1"/>
+          <p:cNvSpPr>
+            <a:spLocks noGrp="1"/>
+          </p:cNvSpPr>
+          <p:nvPr>
+            <p:ph type="title"/>
+          </p:nvPr>
+        </p:nvSpPr>
+        <p:spPr/>
+        <p:txBody>
+          <a:bodyPr/>
+          <a:lstStyle/>
+          <a:p>
+            <a:r>
+              <a:rPr lang="de-DE" dirty="0" err="1"/>
+              <a:t>Questions</a:t>
+            </a:r>
+            <a:r>
+              <a:rPr lang="de-DE" dirty="0"/>
+              <a:t>?</a:t>
+            </a:r>
+          </a:p>
+        </p:txBody>
+      </p:sp>
+      <p:sp>
+        <p:nvSpPr>
+          <p:cNvPr id="3" name="Textplatzhalter 2"/>
+          <p:cNvSpPr>
+            <a:spLocks noGrp="1"/>
+          </p:cNvSpPr>
+          <p:nvPr>
+            <p:ph type="body" idx="1"/>
+          </p:nvPr>
+        </p:nvSpPr>
+        <p:spPr/>
+        <p:txBody>
+          <a:bodyPr/>
+          <a:lstStyle/>
+          <a:p>
+            <a:endParaRPr lang="de-DE" dirty="0"/>
+          </a:p>
+        </p:txBody>
+      </p:sp>
+    </p:spTree>
+    <p:extLst>
+      <p:ext uri="{BB962C8B-B14F-4D97-AF65-F5344CB8AC3E}">
+        <p14:creationId xmlns:p14="http://schemas.microsoft.com/office/powerpoint/2010/main" val="4184402693"/>
+      </p:ext>
+    </p:extLst>
+  </p:cSld>
+  <p:clrMapOvr>
+    <a:masterClrMapping/>
+  </p:clrMapOvr>
+  <mc:AlternateContent xmlns:mc="http://schemas.openxmlformats.org/markup-compatibility/2006" xmlns:p14="http://schemas.microsoft.com/office/powerpoint/2010/main">
+    <mc:Choice Requires="p14">
+      <p:transition spd="med" p14:dur="700">
+        <p:fade/>
+      </p:transition>
+    </mc:Choice>
+    <mc:Fallback xmlns="">
+      <p:transition spd="med">
+        <p:fade/>
+      </p:transition>
+    </mc:Fallback>
+  </mc:AlternateContent>
+</p:sld>
+</file>
+
+<file path=ppt/slides/slide9.xml><?xml version="1.0" encoding="utf-8"?>
+<p:sld xmlns:a="http://schemas.openxmlformats.org/drawingml/2006/main" xmlns:r="http://schemas.openxmlformats.org/officeDocument/2006/relationships" xmlns:p="http://schemas.openxmlformats.org/presentationml/2006/main">
+  <p:cSld>
+    <p:spTree>
+      <p:nvGrpSpPr>
+        <p:cNvPr id="1" name=""/>
+        <p:cNvGrpSpPr/>
+        <p:nvPr/>
+      </p:nvGrpSpPr>
+      <p:grpSpPr>
+        <a:xfrm>
+          <a:off x="0" y="0"/>
+          <a:ext cx="0" cy="0"/>
+          <a:chOff x="0" y="0"/>
+          <a:chExt cx="0" cy="0"/>
+        </a:xfrm>
+      </p:grpSpPr>
+      <p:sp>
+        <p:nvSpPr>
           <p:cNvPr id="4" name="Title 3">
             <a:extLst>
               <a:ext uri="{FF2B5EF4-FFF2-40B4-BE49-F238E27FC236}">
@@ -7130,107 +7451,6 @@
     <p:extLst>
       <p:ext uri="{BB962C8B-B14F-4D97-AF65-F5344CB8AC3E}">
         <p14:creationId xmlns:p14="http://schemas.microsoft.com/office/powerpoint/2010/main" val="3101990871"/>
-      </p:ext>
-    </p:extLst>
-  </p:cSld>
-  <p:clrMapOvr>
-    <a:masterClrMapping/>
-  </p:clrMapOvr>
-</p:sld>
-</file>
-
-<file path=ppt/slides/slide9.xml><?xml version="1.0" encoding="utf-8"?>
-<p:sld xmlns:a="http://schemas.openxmlformats.org/drawingml/2006/main" xmlns:r="http://schemas.openxmlformats.org/officeDocument/2006/relationships" xmlns:p="http://schemas.openxmlformats.org/presentationml/2006/main">
-  <p:cSld>
-    <p:spTree>
-      <p:nvGrpSpPr>
-        <p:cNvPr id="1" name=""/>
-        <p:cNvGrpSpPr/>
-        <p:nvPr/>
-      </p:nvGrpSpPr>
-      <p:grpSpPr>
-        <a:xfrm>
-          <a:off x="0" y="0"/>
-          <a:ext cx="0" cy="0"/>
-          <a:chOff x="0" y="0"/>
-          <a:chExt cx="0" cy="0"/>
-        </a:xfrm>
-      </p:grpSpPr>
-      <p:sp>
-        <p:nvSpPr>
-          <p:cNvPr id="2" name="Title 1">
-            <a:extLst>
-              <a:ext uri="{FF2B5EF4-FFF2-40B4-BE49-F238E27FC236}">
-                <a16:creationId xmlns:a16="http://schemas.microsoft.com/office/drawing/2014/main" id="{EB1673A5-9906-4874-913C-0D8CCBCBE0BD}"/>
-              </a:ext>
-            </a:extLst>
-          </p:cNvPr>
-          <p:cNvSpPr>
-            <a:spLocks noGrp="1"/>
-          </p:cNvSpPr>
-          <p:nvPr>
-            <p:ph type="title"/>
-          </p:nvPr>
-        </p:nvSpPr>
-        <p:spPr/>
-        <p:txBody>
-          <a:bodyPr/>
-          <a:lstStyle/>
-          <a:p>
-            <a:r>
-              <a:rPr lang="nb-NO" dirty="0"/>
-              <a:t>VS Code </a:t>
-            </a:r>
-            <a:r>
-              <a:rPr lang="nb-NO" dirty="0" err="1"/>
-              <a:t>Extension</a:t>
-            </a:r>
-            <a:r>
-              <a:rPr lang="nb-NO" dirty="0"/>
-              <a:t> for </a:t>
-            </a:r>
-            <a:r>
-              <a:rPr lang="nb-NO" dirty="0" err="1"/>
-              <a:t>Docker</a:t>
-            </a:r>
-            <a:endParaRPr lang="nb-NO" dirty="0"/>
-          </a:p>
-        </p:txBody>
-      </p:sp>
-      <p:pic>
-        <p:nvPicPr>
-          <p:cNvPr id="3" name="Picture 2">
-            <a:extLst>
-              <a:ext uri="{FF2B5EF4-FFF2-40B4-BE49-F238E27FC236}">
-                <a16:creationId xmlns:a16="http://schemas.microsoft.com/office/drawing/2014/main" id="{C18D52DD-5CB6-49D8-A55F-61CB6B8100AC}"/>
-              </a:ext>
-            </a:extLst>
-          </p:cNvPr>
-          <p:cNvPicPr>
-            <a:picLocks noChangeAspect="1"/>
-          </p:cNvPicPr>
-          <p:nvPr/>
-        </p:nvPicPr>
-        <p:blipFill>
-          <a:blip r:embed="rId3"/>
-          <a:stretch>
-            <a:fillRect/>
-          </a:stretch>
-        </p:blipFill>
-        <p:spPr>
-          <a:xfrm>
-            <a:off x="683568" y="1844824"/>
-            <a:ext cx="7400000" cy="4219048"/>
-          </a:xfrm>
-          <a:prstGeom prst="rect">
-            <a:avLst/>
-          </a:prstGeom>
-        </p:spPr>
-      </p:pic>
-    </p:spTree>
-    <p:extLst>
-      <p:ext uri="{BB962C8B-B14F-4D97-AF65-F5344CB8AC3E}">
-        <p14:creationId xmlns:p14="http://schemas.microsoft.com/office/powerpoint/2010/main" val="29313995"/>
       </p:ext>
     </p:extLst>
   </p:cSld>

</xml_diff>